<commit_message>
Cosmetics and new Huh? files
</commit_message>
<xml_diff>
--- a/inst/www/How does multiple regression work.pptx
+++ b/inst/www/How does multiple regression work.pptx
@@ -295,7 +295,7 @@
           <a:p>
             <a:fld id="{553B3F7B-B737-4424-9DB3-C4618B0817C9}" type="datetimeFigureOut">
               <a:rPr lang="en-US" smtClean="0"/>
-              <a:t>12/4/2015</a:t>
+              <a:t>12/11/2015</a:t>
             </a:fld>
             <a:endParaRPr lang="en-US"/>
           </a:p>
@@ -465,7 +465,7 @@
           <a:p>
             <a:fld id="{553B3F7B-B737-4424-9DB3-C4618B0817C9}" type="datetimeFigureOut">
               <a:rPr lang="en-US" smtClean="0"/>
-              <a:t>12/4/2015</a:t>
+              <a:t>12/11/2015</a:t>
             </a:fld>
             <a:endParaRPr lang="en-US"/>
           </a:p>
@@ -645,7 +645,7 @@
           <a:p>
             <a:fld id="{553B3F7B-B737-4424-9DB3-C4618B0817C9}" type="datetimeFigureOut">
               <a:rPr lang="en-US" smtClean="0"/>
-              <a:t>12/4/2015</a:t>
+              <a:t>12/11/2015</a:t>
             </a:fld>
             <a:endParaRPr lang="en-US"/>
           </a:p>
@@ -815,7 +815,7 @@
           <a:p>
             <a:fld id="{553B3F7B-B737-4424-9DB3-C4618B0817C9}" type="datetimeFigureOut">
               <a:rPr lang="en-US" smtClean="0"/>
-              <a:t>12/4/2015</a:t>
+              <a:t>12/11/2015</a:t>
             </a:fld>
             <a:endParaRPr lang="en-US"/>
           </a:p>
@@ -1061,7 +1061,7 @@
           <a:p>
             <a:fld id="{553B3F7B-B737-4424-9DB3-C4618B0817C9}" type="datetimeFigureOut">
               <a:rPr lang="en-US" smtClean="0"/>
-              <a:t>12/4/2015</a:t>
+              <a:t>12/11/2015</a:t>
             </a:fld>
             <a:endParaRPr lang="en-US"/>
           </a:p>
@@ -1349,7 +1349,7 @@
           <a:p>
             <a:fld id="{553B3F7B-B737-4424-9DB3-C4618B0817C9}" type="datetimeFigureOut">
               <a:rPr lang="en-US" smtClean="0"/>
-              <a:t>12/4/2015</a:t>
+              <a:t>12/11/2015</a:t>
             </a:fld>
             <a:endParaRPr lang="en-US"/>
           </a:p>
@@ -1771,7 +1771,7 @@
           <a:p>
             <a:fld id="{553B3F7B-B737-4424-9DB3-C4618B0817C9}" type="datetimeFigureOut">
               <a:rPr lang="en-US" smtClean="0"/>
-              <a:t>12/4/2015</a:t>
+              <a:t>12/11/2015</a:t>
             </a:fld>
             <a:endParaRPr lang="en-US"/>
           </a:p>
@@ -1889,7 +1889,7 @@
           <a:p>
             <a:fld id="{553B3F7B-B737-4424-9DB3-C4618B0817C9}" type="datetimeFigureOut">
               <a:rPr lang="en-US" smtClean="0"/>
-              <a:t>12/4/2015</a:t>
+              <a:t>12/11/2015</a:t>
             </a:fld>
             <a:endParaRPr lang="en-US"/>
           </a:p>
@@ -1984,7 +1984,7 @@
           <a:p>
             <a:fld id="{553B3F7B-B737-4424-9DB3-C4618B0817C9}" type="datetimeFigureOut">
               <a:rPr lang="en-US" smtClean="0"/>
-              <a:t>12/4/2015</a:t>
+              <a:t>12/11/2015</a:t>
             </a:fld>
             <a:endParaRPr lang="en-US"/>
           </a:p>
@@ -2261,7 +2261,7 @@
           <a:p>
             <a:fld id="{553B3F7B-B737-4424-9DB3-C4618B0817C9}" type="datetimeFigureOut">
               <a:rPr lang="en-US" smtClean="0"/>
-              <a:t>12/4/2015</a:t>
+              <a:t>12/11/2015</a:t>
             </a:fld>
             <a:endParaRPr lang="en-US"/>
           </a:p>
@@ -2514,7 +2514,7 @@
           <a:p>
             <a:fld id="{553B3F7B-B737-4424-9DB3-C4618B0817C9}" type="datetimeFigureOut">
               <a:rPr lang="en-US" smtClean="0"/>
-              <a:t>12/4/2015</a:t>
+              <a:t>12/11/2015</a:t>
             </a:fld>
             <a:endParaRPr lang="en-US"/>
           </a:p>
@@ -2727,7 +2727,7 @@
           <a:p>
             <a:fld id="{553B3F7B-B737-4424-9DB3-C4618B0817C9}" type="datetimeFigureOut">
               <a:rPr lang="en-US" smtClean="0"/>
-              <a:t>12/4/2015</a:t>
+              <a:t>12/11/2015</a:t>
             </a:fld>
             <a:endParaRPr lang="en-US"/>
           </a:p>
@@ -3140,7 +3140,11 @@
           <a:bodyPr/>
           <a:lstStyle/>
           <a:p>
-            <a:endParaRPr lang="en-US"/>
+            <a:r>
+              <a:rPr lang="en-US" dirty="0"/>
+              <a:t>https://qitools.ocpu.io/charts/www/</a:t>
+            </a:r>
+            <a:endParaRPr lang="en-US" dirty="0"/>
           </a:p>
         </p:txBody>
       </p:sp>
@@ -3183,7 +3187,7 @@
       </p:grpSpPr>
       <p:pic>
         <p:nvPicPr>
-          <p:cNvPr id="1026" name="Picture 2"/>
+          <p:cNvPr id="1029" name="Picture 5"/>
           <p:cNvPicPr>
             <a:picLocks noChangeAspect="1" noChangeArrowheads="1"/>
           </p:cNvPicPr>
@@ -3204,8 +3208,8 @@
         </p:blipFill>
         <p:spPr bwMode="auto">
           <a:xfrm>
-            <a:off x="566422" y="10510"/>
-            <a:ext cx="8011157" cy="6836980"/>
+            <a:off x="457200" y="0"/>
+            <a:ext cx="8229600" cy="6858000"/>
           </a:xfrm>
           <a:prstGeom prst="rect">
             <a:avLst/>
@@ -3274,7 +3278,7 @@
       </p:grpSpPr>
       <p:pic>
         <p:nvPicPr>
-          <p:cNvPr id="2050" name="Picture 2"/>
+          <p:cNvPr id="3" name="Picture 2"/>
           <p:cNvPicPr>
             <a:picLocks noChangeAspect="1" noChangeArrowheads="1"/>
           </p:cNvPicPr>
@@ -3295,8 +3299,8 @@
         </p:blipFill>
         <p:spPr bwMode="auto">
           <a:xfrm>
-            <a:off x="567961" y="11824"/>
-            <a:ext cx="8008078" cy="6834352"/>
+            <a:off x="457200" y="0"/>
+            <a:ext cx="8229600" cy="6858000"/>
           </a:xfrm>
           <a:prstGeom prst="rect">
             <a:avLst/>
@@ -3334,7 +3338,7 @@
         </p:nvSpPr>
         <p:spPr>
           <a:xfrm>
-            <a:off x="4953000" y="1905000"/>
+            <a:off x="4953000" y="1600200"/>
             <a:ext cx="2743200" cy="923330"/>
           </a:xfrm>
           <a:prstGeom prst="rect">
@@ -3417,7 +3421,7 @@
       </p:grpSpPr>
       <p:pic>
         <p:nvPicPr>
-          <p:cNvPr id="3074" name="Picture 2"/>
+          <p:cNvPr id="2" name="Picture 2"/>
           <p:cNvPicPr>
             <a:picLocks noChangeAspect="1" noChangeArrowheads="1"/>
           </p:cNvPicPr>
@@ -3438,8 +3442,8 @@
         </p:blipFill>
         <p:spPr bwMode="auto">
           <a:xfrm>
-            <a:off x="560264" y="5255"/>
-            <a:ext cx="8023472" cy="6847490"/>
+            <a:off x="457200" y="0"/>
+            <a:ext cx="8229600" cy="6858000"/>
           </a:xfrm>
           <a:prstGeom prst="rect">
             <a:avLst/>
@@ -3477,7 +3481,7 @@
         </p:nvSpPr>
         <p:spPr>
           <a:xfrm>
-            <a:off x="4953000" y="1905000"/>
+            <a:off x="4953000" y="1676400"/>
             <a:ext cx="2743200" cy="646331"/>
           </a:xfrm>
           <a:prstGeom prst="rect">
@@ -3555,7 +3559,7 @@
       </p:grpSpPr>
       <p:pic>
         <p:nvPicPr>
-          <p:cNvPr id="4098" name="Picture 2"/>
+          <p:cNvPr id="2" name="Picture 2"/>
           <p:cNvPicPr>
             <a:picLocks noChangeAspect="1" noChangeArrowheads="1"/>
           </p:cNvPicPr>
@@ -3576,8 +3580,8 @@
         </p:blipFill>
         <p:spPr bwMode="auto">
           <a:xfrm>
-            <a:off x="554107" y="0"/>
-            <a:ext cx="8035787" cy="6858000"/>
+            <a:off x="457200" y="0"/>
+            <a:ext cx="8229600" cy="6858000"/>
           </a:xfrm>
           <a:prstGeom prst="rect">
             <a:avLst/>
@@ -3615,7 +3619,7 @@
         </p:nvSpPr>
         <p:spPr>
           <a:xfrm>
-            <a:off x="4953000" y="1905000"/>
+            <a:off x="4953000" y="1600200"/>
             <a:ext cx="2743200" cy="1754326"/>
           </a:xfrm>
           <a:prstGeom prst="rect">
@@ -3698,7 +3702,7 @@
       </p:grpSpPr>
       <p:pic>
         <p:nvPicPr>
-          <p:cNvPr id="5122" name="Picture 2"/>
+          <p:cNvPr id="2" name="Picture 2"/>
           <p:cNvPicPr>
             <a:picLocks noChangeAspect="1" noChangeArrowheads="1"/>
           </p:cNvPicPr>
@@ -3719,8 +3723,8 @@
         </p:blipFill>
         <p:spPr bwMode="auto">
           <a:xfrm>
-            <a:off x="554107" y="0"/>
-            <a:ext cx="8035787" cy="6858000"/>
+            <a:off x="457200" y="0"/>
+            <a:ext cx="8229600" cy="6858000"/>
           </a:xfrm>
           <a:prstGeom prst="rect">
             <a:avLst/>
@@ -3758,7 +3762,7 @@
         </p:nvSpPr>
         <p:spPr>
           <a:xfrm>
-            <a:off x="4953000" y="1905000"/>
+            <a:off x="4953000" y="1600200"/>
             <a:ext cx="2743200" cy="646331"/>
           </a:xfrm>
           <a:prstGeom prst="rect">
@@ -3833,7 +3837,7 @@
       </p:grpSpPr>
       <p:pic>
         <p:nvPicPr>
-          <p:cNvPr id="6147" name="Picture 3"/>
+          <p:cNvPr id="6146" name="Picture 2"/>
           <p:cNvPicPr>
             <a:picLocks noChangeAspect="1" noChangeArrowheads="1"/>
           </p:cNvPicPr>
@@ -3854,8 +3858,8 @@
         </p:blipFill>
         <p:spPr bwMode="auto">
           <a:xfrm>
-            <a:off x="554107" y="0"/>
-            <a:ext cx="8035787" cy="6858000"/>
+            <a:off x="457200" y="0"/>
+            <a:ext cx="8229600" cy="6858000"/>
           </a:xfrm>
           <a:prstGeom prst="rect">
             <a:avLst/>
@@ -3893,7 +3897,7 @@
         </p:nvSpPr>
         <p:spPr>
           <a:xfrm>
-            <a:off x="4953000" y="1905000"/>
+            <a:off x="4953000" y="1600200"/>
             <a:ext cx="2743200" cy="646331"/>
           </a:xfrm>
           <a:prstGeom prst="rect">
@@ -3968,7 +3972,7 @@
       </p:grpSpPr>
       <p:pic>
         <p:nvPicPr>
-          <p:cNvPr id="8194" name="Picture 2"/>
+          <p:cNvPr id="7170" name="Picture 2"/>
           <p:cNvPicPr>
             <a:picLocks noChangeAspect="1" noChangeArrowheads="1"/>
           </p:cNvPicPr>
@@ -3989,8 +3993,8 @@
         </p:blipFill>
         <p:spPr bwMode="auto">
           <a:xfrm>
-            <a:off x="554107" y="0"/>
-            <a:ext cx="8035787" cy="6858000"/>
+            <a:off x="457200" y="0"/>
+            <a:ext cx="8229600" cy="6858000"/>
           </a:xfrm>
           <a:prstGeom prst="rect">
             <a:avLst/>
@@ -4028,7 +4032,7 @@
         </p:nvSpPr>
         <p:spPr>
           <a:xfrm>
-            <a:off x="4953000" y="1905000"/>
+            <a:off x="4953000" y="1600200"/>
             <a:ext cx="2743200" cy="1754326"/>
           </a:xfrm>
           <a:prstGeom prst="rect">

</xml_diff>

<commit_message>
Added citation to final slide
</commit_message>
<xml_diff>
--- a/inst/www/How does multiple regression work.pptx
+++ b/inst/www/How does multiple regression work.pptx
@@ -13,6 +13,7 @@
     <p:sldId id="261" r:id="rId7"/>
     <p:sldId id="262" r:id="rId8"/>
     <p:sldId id="264" r:id="rId9"/>
+    <p:sldId id="265" r:id="rId10"/>
   </p:sldIdLst>
   <p:sldSz cx="9144000" cy="6858000" type="screen4x3"/>
   <p:notesSz cx="6858000" cy="9144000"/>
@@ -111,6 +112,22 @@
       </a:defRPr>
     </a:lvl9pPr>
   </p:defaultTextStyle>
+  <p:extLst>
+    <p:ext uri="{EFAFB233-063F-42B5-8137-9DF3F51BA10A}">
+      <p15:sldGuideLst xmlns:p15="http://schemas.microsoft.com/office/powerpoint/2012/main">
+        <p15:guide id="1" orient="horz" pos="2160">
+          <p15:clr>
+            <a:srgbClr val="A4A3A4"/>
+          </p15:clr>
+        </p15:guide>
+        <p15:guide id="2" pos="2880">
+          <p15:clr>
+            <a:srgbClr val="A4A3A4"/>
+          </p15:clr>
+        </p15:guide>
+      </p15:sldGuideLst>
+    </p:ext>
+  </p:extLst>
 </p:presentation>
 </file>
 
@@ -152,10 +169,9 @@
           <a:lstStyle/>
           <a:p>
             <a:r>
-              <a:rPr lang="en-US" smtClean="0"/>
+              <a:rPr lang="en-US"/>
               <a:t>Click to edit Master title style</a:t>
             </a:r>
-            <a:endParaRPr lang="en-US"/>
           </a:p>
         </p:txBody>
       </p:sp>
@@ -271,10 +287,9 @@
           </a:lstStyle>
           <a:p>
             <a:r>
-              <a:rPr lang="en-US" smtClean="0"/>
+              <a:rPr lang="en-US"/>
               <a:t>Click to edit Master subtitle style</a:t>
             </a:r>
-            <a:endParaRPr lang="en-US"/>
           </a:p>
         </p:txBody>
       </p:sp>
@@ -295,7 +310,7 @@
           <a:p>
             <a:fld id="{553B3F7B-B737-4424-9DB3-C4618B0817C9}" type="datetimeFigureOut">
               <a:rPr lang="en-US" smtClean="0"/>
-              <a:t>12/11/2015</a:t>
+              <a:t>1/23/2024</a:t>
             </a:fld>
             <a:endParaRPr lang="en-US"/>
           </a:p>
@@ -389,10 +404,9 @@
           <a:lstStyle/>
           <a:p>
             <a:r>
-              <a:rPr lang="en-US" smtClean="0"/>
+              <a:rPr lang="en-US"/>
               <a:t>Click to edit Master title style</a:t>
             </a:r>
-            <a:endParaRPr lang="en-US"/>
           </a:p>
         </p:txBody>
       </p:sp>
@@ -413,38 +427,37 @@
           <a:p>
             <a:pPr lvl="0"/>
             <a:r>
-              <a:rPr lang="en-US" smtClean="0"/>
+              <a:rPr lang="en-US"/>
               <a:t>Click to edit Master text styles</a:t>
             </a:r>
           </a:p>
           <a:p>
             <a:pPr lvl="1"/>
             <a:r>
-              <a:rPr lang="en-US" smtClean="0"/>
+              <a:rPr lang="en-US"/>
               <a:t>Second level</a:t>
             </a:r>
           </a:p>
           <a:p>
             <a:pPr lvl="2"/>
             <a:r>
-              <a:rPr lang="en-US" smtClean="0"/>
+              <a:rPr lang="en-US"/>
               <a:t>Third level</a:t>
             </a:r>
           </a:p>
           <a:p>
             <a:pPr lvl="3"/>
             <a:r>
-              <a:rPr lang="en-US" smtClean="0"/>
+              <a:rPr lang="en-US"/>
               <a:t>Fourth level</a:t>
             </a:r>
           </a:p>
           <a:p>
             <a:pPr lvl="4"/>
             <a:r>
-              <a:rPr lang="en-US" smtClean="0"/>
+              <a:rPr lang="en-US"/>
               <a:t>Fifth level</a:t>
             </a:r>
-            <a:endParaRPr lang="en-US"/>
           </a:p>
         </p:txBody>
       </p:sp>
@@ -465,7 +478,7 @@
           <a:p>
             <a:fld id="{553B3F7B-B737-4424-9DB3-C4618B0817C9}" type="datetimeFigureOut">
               <a:rPr lang="en-US" smtClean="0"/>
-              <a:t>12/11/2015</a:t>
+              <a:t>1/23/2024</a:t>
             </a:fld>
             <a:endParaRPr lang="en-US"/>
           </a:p>
@@ -564,10 +577,9 @@
           <a:lstStyle/>
           <a:p>
             <a:r>
-              <a:rPr lang="en-US" smtClean="0"/>
+              <a:rPr lang="en-US"/>
               <a:t>Click to edit Master title style</a:t>
             </a:r>
-            <a:endParaRPr lang="en-US"/>
           </a:p>
         </p:txBody>
       </p:sp>
@@ -593,38 +605,37 @@
           <a:p>
             <a:pPr lvl="0"/>
             <a:r>
-              <a:rPr lang="en-US" smtClean="0"/>
+              <a:rPr lang="en-US"/>
               <a:t>Click to edit Master text styles</a:t>
             </a:r>
           </a:p>
           <a:p>
             <a:pPr lvl="1"/>
             <a:r>
-              <a:rPr lang="en-US" smtClean="0"/>
+              <a:rPr lang="en-US"/>
               <a:t>Second level</a:t>
             </a:r>
           </a:p>
           <a:p>
             <a:pPr lvl="2"/>
             <a:r>
-              <a:rPr lang="en-US" smtClean="0"/>
+              <a:rPr lang="en-US"/>
               <a:t>Third level</a:t>
             </a:r>
           </a:p>
           <a:p>
             <a:pPr lvl="3"/>
             <a:r>
-              <a:rPr lang="en-US" smtClean="0"/>
+              <a:rPr lang="en-US"/>
               <a:t>Fourth level</a:t>
             </a:r>
           </a:p>
           <a:p>
             <a:pPr lvl="4"/>
             <a:r>
-              <a:rPr lang="en-US" smtClean="0"/>
+              <a:rPr lang="en-US"/>
               <a:t>Fifth level</a:t>
             </a:r>
-            <a:endParaRPr lang="en-US"/>
           </a:p>
         </p:txBody>
       </p:sp>
@@ -645,7 +656,7 @@
           <a:p>
             <a:fld id="{553B3F7B-B737-4424-9DB3-C4618B0817C9}" type="datetimeFigureOut">
               <a:rPr lang="en-US" smtClean="0"/>
-              <a:t>12/11/2015</a:t>
+              <a:t>1/23/2024</a:t>
             </a:fld>
             <a:endParaRPr lang="en-US"/>
           </a:p>
@@ -739,10 +750,9 @@
           <a:lstStyle/>
           <a:p>
             <a:r>
-              <a:rPr lang="en-US" smtClean="0"/>
+              <a:rPr lang="en-US"/>
               <a:t>Click to edit Master title style</a:t>
             </a:r>
-            <a:endParaRPr lang="en-US"/>
           </a:p>
         </p:txBody>
       </p:sp>
@@ -763,38 +773,37 @@
           <a:p>
             <a:pPr lvl="0"/>
             <a:r>
-              <a:rPr lang="en-US" smtClean="0"/>
+              <a:rPr lang="en-US"/>
               <a:t>Click to edit Master text styles</a:t>
             </a:r>
           </a:p>
           <a:p>
             <a:pPr lvl="1"/>
             <a:r>
-              <a:rPr lang="en-US" smtClean="0"/>
+              <a:rPr lang="en-US"/>
               <a:t>Second level</a:t>
             </a:r>
           </a:p>
           <a:p>
             <a:pPr lvl="2"/>
             <a:r>
-              <a:rPr lang="en-US" smtClean="0"/>
+              <a:rPr lang="en-US"/>
               <a:t>Third level</a:t>
             </a:r>
           </a:p>
           <a:p>
             <a:pPr lvl="3"/>
             <a:r>
-              <a:rPr lang="en-US" smtClean="0"/>
+              <a:rPr lang="en-US"/>
               <a:t>Fourth level</a:t>
             </a:r>
           </a:p>
           <a:p>
             <a:pPr lvl="4"/>
             <a:r>
-              <a:rPr lang="en-US" smtClean="0"/>
+              <a:rPr lang="en-US"/>
               <a:t>Fifth level</a:t>
             </a:r>
-            <a:endParaRPr lang="en-US"/>
           </a:p>
         </p:txBody>
       </p:sp>
@@ -815,7 +824,7 @@
           <a:p>
             <a:fld id="{553B3F7B-B737-4424-9DB3-C4618B0817C9}" type="datetimeFigureOut">
               <a:rPr lang="en-US" smtClean="0"/>
-              <a:t>12/11/2015</a:t>
+              <a:t>1/23/2024</a:t>
             </a:fld>
             <a:endParaRPr lang="en-US"/>
           </a:p>
@@ -918,10 +927,9 @@
           </a:lstStyle>
           <a:p>
             <a:r>
-              <a:rPr lang="en-US" smtClean="0"/>
+              <a:rPr lang="en-US"/>
               <a:t>Click to edit Master title style</a:t>
             </a:r>
-            <a:endParaRPr lang="en-US"/>
           </a:p>
         </p:txBody>
       </p:sp>
@@ -1038,7 +1046,7 @@
           <a:p>
             <a:pPr lvl="0"/>
             <a:r>
-              <a:rPr lang="en-US" smtClean="0"/>
+              <a:rPr lang="en-US"/>
               <a:t>Click to edit Master text styles</a:t>
             </a:r>
           </a:p>
@@ -1061,7 +1069,7 @@
           <a:p>
             <a:fld id="{553B3F7B-B737-4424-9DB3-C4618B0817C9}" type="datetimeFigureOut">
               <a:rPr lang="en-US" smtClean="0"/>
-              <a:t>12/11/2015</a:t>
+              <a:t>1/23/2024</a:t>
             </a:fld>
             <a:endParaRPr lang="en-US"/>
           </a:p>
@@ -1155,10 +1163,9 @@
           <a:lstStyle/>
           <a:p>
             <a:r>
-              <a:rPr lang="en-US" smtClean="0"/>
+              <a:rPr lang="en-US"/>
               <a:t>Click to edit Master title style</a:t>
             </a:r>
-            <a:endParaRPr lang="en-US"/>
           </a:p>
         </p:txBody>
       </p:sp>
@@ -1212,38 +1219,37 @@
           <a:p>
             <a:pPr lvl="0"/>
             <a:r>
-              <a:rPr lang="en-US" smtClean="0"/>
+              <a:rPr lang="en-US"/>
               <a:t>Click to edit Master text styles</a:t>
             </a:r>
           </a:p>
           <a:p>
             <a:pPr lvl="1"/>
             <a:r>
-              <a:rPr lang="en-US" smtClean="0"/>
+              <a:rPr lang="en-US"/>
               <a:t>Second level</a:t>
             </a:r>
           </a:p>
           <a:p>
             <a:pPr lvl="2"/>
             <a:r>
-              <a:rPr lang="en-US" smtClean="0"/>
+              <a:rPr lang="en-US"/>
               <a:t>Third level</a:t>
             </a:r>
           </a:p>
           <a:p>
             <a:pPr lvl="3"/>
             <a:r>
-              <a:rPr lang="en-US" smtClean="0"/>
+              <a:rPr lang="en-US"/>
               <a:t>Fourth level</a:t>
             </a:r>
           </a:p>
           <a:p>
             <a:pPr lvl="4"/>
             <a:r>
-              <a:rPr lang="en-US" smtClean="0"/>
+              <a:rPr lang="en-US"/>
               <a:t>Fifth level</a:t>
             </a:r>
-            <a:endParaRPr lang="en-US"/>
           </a:p>
         </p:txBody>
       </p:sp>
@@ -1297,38 +1303,37 @@
           <a:p>
             <a:pPr lvl="0"/>
             <a:r>
-              <a:rPr lang="en-US" smtClean="0"/>
+              <a:rPr lang="en-US"/>
               <a:t>Click to edit Master text styles</a:t>
             </a:r>
           </a:p>
           <a:p>
             <a:pPr lvl="1"/>
             <a:r>
-              <a:rPr lang="en-US" smtClean="0"/>
+              <a:rPr lang="en-US"/>
               <a:t>Second level</a:t>
             </a:r>
           </a:p>
           <a:p>
             <a:pPr lvl="2"/>
             <a:r>
-              <a:rPr lang="en-US" smtClean="0"/>
+              <a:rPr lang="en-US"/>
               <a:t>Third level</a:t>
             </a:r>
           </a:p>
           <a:p>
             <a:pPr lvl="3"/>
             <a:r>
-              <a:rPr lang="en-US" smtClean="0"/>
+              <a:rPr lang="en-US"/>
               <a:t>Fourth level</a:t>
             </a:r>
           </a:p>
           <a:p>
             <a:pPr lvl="4"/>
             <a:r>
-              <a:rPr lang="en-US" smtClean="0"/>
+              <a:rPr lang="en-US"/>
               <a:t>Fifth level</a:t>
             </a:r>
-            <a:endParaRPr lang="en-US"/>
           </a:p>
         </p:txBody>
       </p:sp>
@@ -1349,7 +1354,7 @@
           <a:p>
             <a:fld id="{553B3F7B-B737-4424-9DB3-C4618B0817C9}" type="datetimeFigureOut">
               <a:rPr lang="en-US" smtClean="0"/>
-              <a:t>12/11/2015</a:t>
+              <a:t>1/23/2024</a:t>
             </a:fld>
             <a:endParaRPr lang="en-US"/>
           </a:p>
@@ -1447,10 +1452,9 @@
           </a:lstStyle>
           <a:p>
             <a:r>
-              <a:rPr lang="en-US" smtClean="0"/>
+              <a:rPr lang="en-US"/>
               <a:t>Click to edit Master title style</a:t>
             </a:r>
-            <a:endParaRPr lang="en-US"/>
           </a:p>
         </p:txBody>
       </p:sp>
@@ -1513,7 +1517,7 @@
           <a:p>
             <a:pPr lvl="0"/>
             <a:r>
-              <a:rPr lang="en-US" smtClean="0"/>
+              <a:rPr lang="en-US"/>
               <a:t>Click to edit Master text styles</a:t>
             </a:r>
           </a:p>
@@ -1569,38 +1573,37 @@
           <a:p>
             <a:pPr lvl="0"/>
             <a:r>
-              <a:rPr lang="en-US" smtClean="0"/>
+              <a:rPr lang="en-US"/>
               <a:t>Click to edit Master text styles</a:t>
             </a:r>
           </a:p>
           <a:p>
             <a:pPr lvl="1"/>
             <a:r>
-              <a:rPr lang="en-US" smtClean="0"/>
+              <a:rPr lang="en-US"/>
               <a:t>Second level</a:t>
             </a:r>
           </a:p>
           <a:p>
             <a:pPr lvl="2"/>
             <a:r>
-              <a:rPr lang="en-US" smtClean="0"/>
+              <a:rPr lang="en-US"/>
               <a:t>Third level</a:t>
             </a:r>
           </a:p>
           <a:p>
             <a:pPr lvl="3"/>
             <a:r>
-              <a:rPr lang="en-US" smtClean="0"/>
+              <a:rPr lang="en-US"/>
               <a:t>Fourth level</a:t>
             </a:r>
           </a:p>
           <a:p>
             <a:pPr lvl="4"/>
             <a:r>
-              <a:rPr lang="en-US" smtClean="0"/>
+              <a:rPr lang="en-US"/>
               <a:t>Fifth level</a:t>
             </a:r>
-            <a:endParaRPr lang="en-US"/>
           </a:p>
         </p:txBody>
       </p:sp>
@@ -1663,7 +1666,7 @@
           <a:p>
             <a:pPr lvl="0"/>
             <a:r>
-              <a:rPr lang="en-US" smtClean="0"/>
+              <a:rPr lang="en-US"/>
               <a:t>Click to edit Master text styles</a:t>
             </a:r>
           </a:p>
@@ -1719,38 +1722,37 @@
           <a:p>
             <a:pPr lvl="0"/>
             <a:r>
-              <a:rPr lang="en-US" smtClean="0"/>
+              <a:rPr lang="en-US"/>
               <a:t>Click to edit Master text styles</a:t>
             </a:r>
           </a:p>
           <a:p>
             <a:pPr lvl="1"/>
             <a:r>
-              <a:rPr lang="en-US" smtClean="0"/>
+              <a:rPr lang="en-US"/>
               <a:t>Second level</a:t>
             </a:r>
           </a:p>
           <a:p>
             <a:pPr lvl="2"/>
             <a:r>
-              <a:rPr lang="en-US" smtClean="0"/>
+              <a:rPr lang="en-US"/>
               <a:t>Third level</a:t>
             </a:r>
           </a:p>
           <a:p>
             <a:pPr lvl="3"/>
             <a:r>
-              <a:rPr lang="en-US" smtClean="0"/>
+              <a:rPr lang="en-US"/>
               <a:t>Fourth level</a:t>
             </a:r>
           </a:p>
           <a:p>
             <a:pPr lvl="4"/>
             <a:r>
-              <a:rPr lang="en-US" smtClean="0"/>
+              <a:rPr lang="en-US"/>
               <a:t>Fifth level</a:t>
             </a:r>
-            <a:endParaRPr lang="en-US"/>
           </a:p>
         </p:txBody>
       </p:sp>
@@ -1771,7 +1773,7 @@
           <a:p>
             <a:fld id="{553B3F7B-B737-4424-9DB3-C4618B0817C9}" type="datetimeFigureOut">
               <a:rPr lang="en-US" smtClean="0"/>
-              <a:t>12/11/2015</a:t>
+              <a:t>1/23/2024</a:t>
             </a:fld>
             <a:endParaRPr lang="en-US"/>
           </a:p>
@@ -1865,10 +1867,9 @@
           <a:lstStyle/>
           <a:p>
             <a:r>
-              <a:rPr lang="en-US" smtClean="0"/>
+              <a:rPr lang="en-US"/>
               <a:t>Click to edit Master title style</a:t>
             </a:r>
-            <a:endParaRPr lang="en-US"/>
           </a:p>
         </p:txBody>
       </p:sp>
@@ -1889,7 +1890,7 @@
           <a:p>
             <a:fld id="{553B3F7B-B737-4424-9DB3-C4618B0817C9}" type="datetimeFigureOut">
               <a:rPr lang="en-US" smtClean="0"/>
-              <a:t>12/11/2015</a:t>
+              <a:t>1/23/2024</a:t>
             </a:fld>
             <a:endParaRPr lang="en-US"/>
           </a:p>
@@ -1984,7 +1985,7 @@
           <a:p>
             <a:fld id="{553B3F7B-B737-4424-9DB3-C4618B0817C9}" type="datetimeFigureOut">
               <a:rPr lang="en-US" smtClean="0"/>
-              <a:t>12/11/2015</a:t>
+              <a:t>1/23/2024</a:t>
             </a:fld>
             <a:endParaRPr lang="en-US"/>
           </a:p>
@@ -2087,10 +2088,9 @@
           </a:lstStyle>
           <a:p>
             <a:r>
-              <a:rPr lang="en-US" smtClean="0"/>
+              <a:rPr lang="en-US"/>
               <a:t>Click to edit Master title style</a:t>
             </a:r>
-            <a:endParaRPr lang="en-US"/>
           </a:p>
         </p:txBody>
       </p:sp>
@@ -2144,38 +2144,37 @@
           <a:p>
             <a:pPr lvl="0"/>
             <a:r>
-              <a:rPr lang="en-US" smtClean="0"/>
+              <a:rPr lang="en-US"/>
               <a:t>Click to edit Master text styles</a:t>
             </a:r>
           </a:p>
           <a:p>
             <a:pPr lvl="1"/>
             <a:r>
-              <a:rPr lang="en-US" smtClean="0"/>
+              <a:rPr lang="en-US"/>
               <a:t>Second level</a:t>
             </a:r>
           </a:p>
           <a:p>
             <a:pPr lvl="2"/>
             <a:r>
-              <a:rPr lang="en-US" smtClean="0"/>
+              <a:rPr lang="en-US"/>
               <a:t>Third level</a:t>
             </a:r>
           </a:p>
           <a:p>
             <a:pPr lvl="3"/>
             <a:r>
-              <a:rPr lang="en-US" smtClean="0"/>
+              <a:rPr lang="en-US"/>
               <a:t>Fourth level</a:t>
             </a:r>
           </a:p>
           <a:p>
             <a:pPr lvl="4"/>
             <a:r>
-              <a:rPr lang="en-US" smtClean="0"/>
+              <a:rPr lang="en-US"/>
               <a:t>Fifth level</a:t>
             </a:r>
-            <a:endParaRPr lang="en-US"/>
           </a:p>
         </p:txBody>
       </p:sp>
@@ -2238,7 +2237,7 @@
           <a:p>
             <a:pPr lvl="0"/>
             <a:r>
-              <a:rPr lang="en-US" smtClean="0"/>
+              <a:rPr lang="en-US"/>
               <a:t>Click to edit Master text styles</a:t>
             </a:r>
           </a:p>
@@ -2261,7 +2260,7 @@
           <a:p>
             <a:fld id="{553B3F7B-B737-4424-9DB3-C4618B0817C9}" type="datetimeFigureOut">
               <a:rPr lang="en-US" smtClean="0"/>
-              <a:t>12/11/2015</a:t>
+              <a:t>1/23/2024</a:t>
             </a:fld>
             <a:endParaRPr lang="en-US"/>
           </a:p>
@@ -2364,10 +2363,9 @@
           </a:lstStyle>
           <a:p>
             <a:r>
-              <a:rPr lang="en-US" smtClean="0"/>
+              <a:rPr lang="en-US"/>
               <a:t>Click to edit Master title style</a:t>
             </a:r>
-            <a:endParaRPr lang="en-US"/>
           </a:p>
         </p:txBody>
       </p:sp>
@@ -2491,7 +2489,7 @@
           <a:p>
             <a:pPr lvl="0"/>
             <a:r>
-              <a:rPr lang="en-US" smtClean="0"/>
+              <a:rPr lang="en-US"/>
               <a:t>Click to edit Master text styles</a:t>
             </a:r>
           </a:p>
@@ -2514,7 +2512,7 @@
           <a:p>
             <a:fld id="{553B3F7B-B737-4424-9DB3-C4618B0817C9}" type="datetimeFigureOut">
               <a:rPr lang="en-US" smtClean="0"/>
-              <a:t>12/11/2015</a:t>
+              <a:t>1/23/2024</a:t>
             </a:fld>
             <a:endParaRPr lang="en-US"/>
           </a:p>
@@ -2623,10 +2621,9 @@
           <a:lstStyle/>
           <a:p>
             <a:r>
-              <a:rPr lang="en-US" smtClean="0"/>
+              <a:rPr lang="en-US"/>
               <a:t>Click to edit Master title style</a:t>
             </a:r>
-            <a:endParaRPr lang="en-US"/>
           </a:p>
         </p:txBody>
       </p:sp>
@@ -2657,38 +2654,37 @@
           <a:p>
             <a:pPr lvl="0"/>
             <a:r>
-              <a:rPr lang="en-US" smtClean="0"/>
+              <a:rPr lang="en-US"/>
               <a:t>Click to edit Master text styles</a:t>
             </a:r>
           </a:p>
           <a:p>
             <a:pPr lvl="1"/>
             <a:r>
-              <a:rPr lang="en-US" smtClean="0"/>
+              <a:rPr lang="en-US"/>
               <a:t>Second level</a:t>
             </a:r>
           </a:p>
           <a:p>
             <a:pPr lvl="2"/>
             <a:r>
-              <a:rPr lang="en-US" smtClean="0"/>
+              <a:rPr lang="en-US"/>
               <a:t>Third level</a:t>
             </a:r>
           </a:p>
           <a:p>
             <a:pPr lvl="3"/>
             <a:r>
-              <a:rPr lang="en-US" smtClean="0"/>
+              <a:rPr lang="en-US"/>
               <a:t>Fourth level</a:t>
             </a:r>
           </a:p>
           <a:p>
             <a:pPr lvl="4"/>
             <a:r>
-              <a:rPr lang="en-US" smtClean="0"/>
+              <a:rPr lang="en-US"/>
               <a:t>Fifth level</a:t>
             </a:r>
-            <a:endParaRPr lang="en-US"/>
           </a:p>
         </p:txBody>
       </p:sp>
@@ -2727,7 +2723,7 @@
           <a:p>
             <a:fld id="{553B3F7B-B737-4424-9DB3-C4618B0817C9}" type="datetimeFigureOut">
               <a:rPr lang="en-US" smtClean="0"/>
-              <a:t>12/11/2015</a:t>
+              <a:t>1/23/2024</a:t>
             </a:fld>
             <a:endParaRPr lang="en-US"/>
           </a:p>
@@ -3118,10 +3114,9 @@
           <a:lstStyle/>
           <a:p>
             <a:r>
-              <a:rPr lang="en-US" dirty="0" smtClean="0"/>
+              <a:rPr lang="en-US" dirty="0"/>
               <a:t>How does multiple regression work?</a:t>
             </a:r>
-            <a:endParaRPr lang="en-US" dirty="0"/>
           </a:p>
         </p:txBody>
       </p:sp>
@@ -3144,7 +3139,6 @@
               <a:rPr lang="en-US" dirty="0"/>
               <a:t>https://qitools.ocpu.io/charts/www/</a:t>
             </a:r>
-            <a:endParaRPr lang="en-US" dirty="0"/>
           </a:p>
         </p:txBody>
       </p:sp>
@@ -3158,13 +3152,6 @@
   <p:clrMapOvr>
     <a:masterClrMapping/>
   </p:clrMapOvr>
-  <p:timing>
-    <p:tnLst>
-      <p:par>
-        <p:cTn id="1" dur="indefinite" restart="never" nodeType="tmRoot"/>
-      </p:par>
-    </p:tnLst>
-  </p:timing>
 </p:sld>
 </file>
 
@@ -3249,13 +3236,6 @@
   <p:clrMapOvr>
     <a:masterClrMapping/>
   </p:clrMapOvr>
-  <p:timing>
-    <p:tnLst>
-      <p:par>
-        <p:cTn id="1" dur="indefinite" restart="never" nodeType="tmRoot"/>
-      </p:par>
-    </p:tnLst>
-  </p:timing>
 </p:sld>
 </file>
 
@@ -3367,18 +3347,9 @@
           <a:lstStyle/>
           <a:p>
             <a:r>
-              <a:rPr lang="en-US" dirty="0" smtClean="0"/>
-              <a:t>Lets place a line that shows the </a:t>
-            </a:r>
-            <a:r>
               <a:rPr lang="en-US" dirty="0"/>
-              <a:t>regression</a:t>
-            </a:r>
-            <a:r>
-              <a:rPr lang="en-US" dirty="0" smtClean="0"/>
-              <a:t> of time period and rate.</a:t>
-            </a:r>
-            <a:endParaRPr lang="en-US" dirty="0"/>
+              <a:t>Lets place a line that shows the regression of time period and rate.</a:t>
+            </a:r>
           </a:p>
         </p:txBody>
       </p:sp>
@@ -3392,13 +3363,6 @@
   <p:clrMapOvr>
     <a:masterClrMapping/>
   </p:clrMapOvr>
-  <p:timing>
-    <p:tnLst>
-      <p:par>
-        <p:cTn id="1" dur="indefinite" restart="never" nodeType="tmRoot"/>
-      </p:par>
-    </p:tnLst>
-  </p:timing>
 </p:sld>
 </file>
 
@@ -3530,13 +3494,6 @@
   <p:clrMapOvr>
     <a:masterClrMapping/>
   </p:clrMapOvr>
-  <p:timing>
-    <p:tnLst>
-      <p:par>
-        <p:cTn id="1" dur="indefinite" restart="never" nodeType="tmRoot"/>
-      </p:par>
-    </p:tnLst>
-  </p:timing>
 </p:sld>
 </file>
 
@@ -3648,18 +3605,9 @@
           <a:lstStyle/>
           <a:p>
             <a:r>
-              <a:rPr lang="en-US" dirty="0" smtClean="0"/>
-              <a:t>Lets replot the ‘Before trial’ values about the 0 line. </a:t>
-            </a:r>
-            <a:r>
               <a:rPr lang="en-US" dirty="0"/>
-              <a:t>Note</a:t>
-            </a:r>
-            <a:r>
-              <a:rPr lang="en-US" dirty="0" smtClean="0"/>
-              <a:t> how the first two points are one the line and the third remains above the line</a:t>
-            </a:r>
-            <a:endParaRPr lang="en-US" dirty="0"/>
+              <a:t>Lets replot the ‘Before trial’ values about the 0 line. Note how the first two points are one the line and the third remains above the line</a:t>
+            </a:r>
           </a:p>
         </p:txBody>
       </p:sp>
@@ -3673,13 +3621,6 @@
   <p:clrMapOvr>
     <a:masterClrMapping/>
   </p:clrMapOvr>
-  <p:timing>
-    <p:tnLst>
-      <p:par>
-        <p:cTn id="1" dur="indefinite" restart="never" nodeType="tmRoot"/>
-      </p:par>
-    </p:tnLst>
-  </p:timing>
 </p:sld>
 </file>
 
@@ -3791,10 +3732,9 @@
           <a:lstStyle/>
           <a:p>
             <a:r>
-              <a:rPr lang="en-US" dirty="0" smtClean="0"/>
+              <a:rPr lang="en-US" dirty="0"/>
               <a:t>Ok. Let’s plot the mean of the three values</a:t>
             </a:r>
-            <a:endParaRPr lang="en-US" dirty="0"/>
           </a:p>
         </p:txBody>
       </p:sp>
@@ -3808,13 +3748,6 @@
   <p:clrMapOvr>
     <a:masterClrMapping/>
   </p:clrMapOvr>
-  <p:timing>
-    <p:tnLst>
-      <p:par>
-        <p:cTn id="1" dur="indefinite" restart="never" nodeType="tmRoot"/>
-      </p:par>
-    </p:tnLst>
-  </p:timing>
 </p:sld>
 </file>
 
@@ -3926,10 +3859,9 @@
           <a:lstStyle/>
           <a:p>
             <a:r>
-              <a:rPr lang="en-US" dirty="0" smtClean="0"/>
+              <a:rPr lang="en-US" dirty="0"/>
               <a:t>Now, do the same for the ‘After trial’ values.</a:t>
             </a:r>
-            <a:endParaRPr lang="en-US" dirty="0"/>
           </a:p>
         </p:txBody>
       </p:sp>
@@ -3943,13 +3875,6 @@
   <p:clrMapOvr>
     <a:masterClrMapping/>
   </p:clrMapOvr>
-  <p:timing>
-    <p:tnLst>
-      <p:par>
-        <p:cTn id="1" dur="indefinite" restart="never" nodeType="tmRoot"/>
-      </p:par>
-    </p:tnLst>
-  </p:timing>
 </p:sld>
 </file>
 
@@ -4061,24 +3986,23 @@
           <a:lstStyle/>
           <a:p>
             <a:r>
-              <a:rPr lang="en-US" dirty="0" smtClean="0"/>
+              <a:rPr lang="en-US" dirty="0"/>
               <a:t>Finally, add the ‘After trial’ mean. </a:t>
             </a:r>
           </a:p>
           <a:p>
             <a:r>
-              <a:rPr lang="en-US" dirty="0" smtClean="0"/>
+              <a:rPr lang="en-US" dirty="0"/>
               <a:t>Note that, </a:t>
             </a:r>
             <a:r>
-              <a:rPr lang="en-US" i="1" dirty="0" smtClean="0"/>
+              <a:rPr lang="en-US" i="1" dirty="0"/>
               <a:t>after controlling for time period</a:t>
             </a:r>
             <a:r>
-              <a:rPr lang="en-US" dirty="0" smtClean="0"/>
+              <a:rPr lang="en-US" dirty="0"/>
               <a:t>, there is a difference in the mean before and after the trial.</a:t>
             </a:r>
-            <a:endParaRPr lang="en-US" dirty="0"/>
           </a:p>
         </p:txBody>
       </p:sp>
@@ -4092,13 +4016,212 @@
   <p:clrMapOvr>
     <a:masterClrMapping/>
   </p:clrMapOvr>
-  <p:timing>
-    <p:tnLst>
-      <p:par>
-        <p:cTn id="1" dur="indefinite" restart="never" nodeType="tmRoot"/>
-      </p:par>
-    </p:tnLst>
-  </p:timing>
+</p:sld>
+</file>
+
+<file path=ppt/slides/slide9.xml><?xml version="1.0" encoding="utf-8"?>
+<p:sld xmlns:a="http://schemas.openxmlformats.org/drawingml/2006/main" xmlns:r="http://schemas.openxmlformats.org/officeDocument/2006/relationships" xmlns:p="http://schemas.openxmlformats.org/presentationml/2006/main">
+  <p:cSld>
+    <p:spTree>
+      <p:nvGrpSpPr>
+        <p:cNvPr id="1" name=""/>
+        <p:cNvGrpSpPr/>
+        <p:nvPr/>
+      </p:nvGrpSpPr>
+      <p:grpSpPr>
+        <a:xfrm>
+          <a:off x="0" y="0"/>
+          <a:ext cx="0" cy="0"/>
+          <a:chOff x="0" y="0"/>
+          <a:chExt cx="0" cy="0"/>
+        </a:xfrm>
+      </p:grpSpPr>
+      <p:sp>
+        <p:nvSpPr>
+          <p:cNvPr id="2" name="Title 1">
+            <a:extLst>
+              <a:ext uri="{FF2B5EF4-FFF2-40B4-BE49-F238E27FC236}">
+                <a16:creationId xmlns:a16="http://schemas.microsoft.com/office/drawing/2014/main" id="{1B4C2F80-8A34-E976-A1D4-86DD9078B918}"/>
+              </a:ext>
+            </a:extLst>
+          </p:cNvPr>
+          <p:cNvSpPr>
+            <a:spLocks noGrp="1"/>
+          </p:cNvSpPr>
+          <p:nvPr>
+            <p:ph type="title"/>
+          </p:nvPr>
+        </p:nvSpPr>
+        <p:spPr/>
+        <p:txBody>
+          <a:bodyPr/>
+          <a:lstStyle/>
+          <a:p>
+            <a:r>
+              <a:rPr lang="en-US" dirty="0"/>
+              <a:t>References</a:t>
+            </a:r>
+          </a:p>
+        </p:txBody>
+      </p:sp>
+      <p:sp>
+        <p:nvSpPr>
+          <p:cNvPr id="3" name="Content Placeholder 2">
+            <a:extLst>
+              <a:ext uri="{FF2B5EF4-FFF2-40B4-BE49-F238E27FC236}">
+                <a16:creationId xmlns:a16="http://schemas.microsoft.com/office/drawing/2014/main" id="{0467767A-60D5-9F6E-F778-6F2BD48867BF}"/>
+              </a:ext>
+            </a:extLst>
+          </p:cNvPr>
+          <p:cNvSpPr>
+            <a:spLocks noGrp="1"/>
+          </p:cNvSpPr>
+          <p:nvPr>
+            <p:ph idx="1"/>
+          </p:nvPr>
+        </p:nvSpPr>
+        <p:spPr/>
+        <p:txBody>
+          <a:bodyPr/>
+          <a:lstStyle/>
+          <a:p>
+            <a:r>
+              <a:rPr lang="en-US" b="0" i="0" dirty="0" err="1">
+                <a:solidFill>
+                  <a:srgbClr val="212121"/>
+                </a:solidFill>
+                <a:effectLst/>
+                <a:latin typeface="BlinkMacSystemFont"/>
+              </a:rPr>
+              <a:t>Taljaard</a:t>
+            </a:r>
+            <a:r>
+              <a:rPr lang="en-US" b="0" i="0" dirty="0">
+                <a:solidFill>
+                  <a:srgbClr val="212121"/>
+                </a:solidFill>
+                <a:effectLst/>
+                <a:latin typeface="BlinkMacSystemFont"/>
+              </a:rPr>
+              <a:t> M, McKenzie JE, Ramsay CR, Grimshaw JM. The use of segmented regression in </a:t>
+            </a:r>
+            <a:r>
+              <a:rPr lang="en-US" b="0" i="0" dirty="0" err="1">
+                <a:solidFill>
+                  <a:srgbClr val="212121"/>
+                </a:solidFill>
+                <a:effectLst/>
+                <a:latin typeface="BlinkMacSystemFont"/>
+              </a:rPr>
+              <a:t>analysing</a:t>
+            </a:r>
+            <a:r>
+              <a:rPr lang="en-US" b="0" i="0" dirty="0">
+                <a:solidFill>
+                  <a:srgbClr val="212121"/>
+                </a:solidFill>
+                <a:effectLst/>
+                <a:latin typeface="BlinkMacSystemFont"/>
+              </a:rPr>
+              <a:t> interrupted time series studies: an example in pre-hospital ambulance care. Implement Sci. 2014 Jun 19;9:77. </a:t>
+            </a:r>
+            <a:r>
+              <a:rPr lang="en-US" b="0" i="0" dirty="0" err="1">
+                <a:solidFill>
+                  <a:srgbClr val="212121"/>
+                </a:solidFill>
+                <a:effectLst/>
+                <a:latin typeface="BlinkMacSystemFont"/>
+              </a:rPr>
+              <a:t>doi</a:t>
+            </a:r>
+            <a:r>
+              <a:rPr lang="en-US" b="0" i="0" dirty="0">
+                <a:solidFill>
+                  <a:srgbClr val="212121"/>
+                </a:solidFill>
+                <a:effectLst/>
+                <a:latin typeface="BlinkMacSystemFont"/>
+              </a:rPr>
+              <a:t>: </a:t>
+            </a:r>
+            <a:r>
+              <a:rPr lang="en-US" b="0" i="0" dirty="0">
+                <a:solidFill>
+                  <a:srgbClr val="212121"/>
+                </a:solidFill>
+                <a:effectLst/>
+                <a:latin typeface="BlinkMacSystemFont"/>
+                <a:hlinkClick r:id="rId2"/>
+              </a:rPr>
+              <a:t>10.1186/1748-5908-9-77</a:t>
+            </a:r>
+            <a:r>
+              <a:rPr lang="en-US" b="0" i="0" dirty="0">
+                <a:solidFill>
+                  <a:srgbClr val="212121"/>
+                </a:solidFill>
+                <a:effectLst/>
+                <a:latin typeface="BlinkMacSystemFont"/>
+              </a:rPr>
+              <a:t>. PMID: </a:t>
+            </a:r>
+            <a:r>
+              <a:rPr lang="en-US" b="0" i="0" dirty="0">
+                <a:solidFill>
+                  <a:srgbClr val="212121"/>
+                </a:solidFill>
+                <a:effectLst/>
+                <a:latin typeface="BlinkMacSystemFont"/>
+                <a:hlinkClick r:id="rId3"/>
+              </a:rPr>
+              <a:t>24943919</a:t>
+            </a:r>
+            <a:r>
+              <a:rPr lang="en-US" b="0" i="0" dirty="0">
+                <a:solidFill>
+                  <a:srgbClr val="212121"/>
+                </a:solidFill>
+                <a:effectLst/>
+                <a:latin typeface="BlinkMacSystemFont"/>
+              </a:rPr>
+              <a:t>; PMCID: </a:t>
+            </a:r>
+            <a:r>
+              <a:rPr lang="en-US" b="0" i="0" dirty="0">
+                <a:solidFill>
+                  <a:srgbClr val="212121"/>
+                </a:solidFill>
+                <a:effectLst/>
+                <a:latin typeface="BlinkMacSystemFont"/>
+                <a:hlinkClick r:id="rId4"/>
+              </a:rPr>
+              <a:t>PMC4068621</a:t>
+            </a:r>
+            <a:r>
+              <a:rPr lang="en-US" b="0" i="0" dirty="0">
+                <a:solidFill>
+                  <a:srgbClr val="212121"/>
+                </a:solidFill>
+                <a:effectLst/>
+                <a:latin typeface="BlinkMacSystemFont"/>
+              </a:rPr>
+              <a:t>.</a:t>
+            </a:r>
+            <a:endParaRPr lang="en-US" dirty="0"/>
+          </a:p>
+        </p:txBody>
+      </p:sp>
+    </p:spTree>
+    <p:extLst>
+      <p:ext uri="{BB962C8B-B14F-4D97-AF65-F5344CB8AC3E}">
+        <p14:creationId xmlns:p14="http://schemas.microsoft.com/office/powerpoint/2010/main" val="2475991470"/>
+      </p:ext>
+    </p:extLst>
+  </p:cSld>
+  <p:clrMapOvr>
+    <a:masterClrMapping/>
+  </p:clrMapOvr>
 </p:sld>
 </file>
 

</xml_diff>